<commit_message>
Successfully implemented page for picking what color to play as
</commit_message>
<xml_diff>
--- a/react_frontend/public/Images/Draft Images/page ideas.pptx
+++ b/react_frontend/public/Images/Draft Images/page ideas.pptx
@@ -5,7 +5,7 @@
     <p:sldMasterId id="2147483770" r:id="rId1"/>
   </p:sldMasterIdLst>
   <p:notesMasterIdLst>
-    <p:notesMasterId r:id="rId9"/>
+    <p:notesMasterId r:id="rId10"/>
   </p:notesMasterIdLst>
   <p:sldIdLst>
     <p:sldId id="265" r:id="rId2"/>
@@ -15,6 +15,7 @@
     <p:sldId id="266" r:id="rId6"/>
     <p:sldId id="267" r:id="rId7"/>
     <p:sldId id="268" r:id="rId8"/>
+    <p:sldId id="269" r:id="rId9"/>
   </p:sldIdLst>
   <p:sldSz cx="12192000" cy="6858000"/>
   <p:notesSz cx="6858000" cy="9144000"/>
@@ -203,7 +204,7 @@
           <a:p>
             <a:fld id="{C9B821EE-64D9-4FB8-A02C-362FA67433CA}" type="datetimeFigureOut">
               <a:rPr lang="en-US" smtClean="0"/>
-              <a:t>6/6/2020</a:t>
+              <a:t>7/25/2020</a:t>
             </a:fld>
             <a:endParaRPr lang="en-US"/>
           </a:p>
@@ -785,7 +786,7 @@
           <a:p>
             <a:fld id="{F75DBC4B-2C55-40A7-A38B-8D2654D87339}" type="datetimeFigureOut">
               <a:rPr lang="en-US" smtClean="0"/>
-              <a:t>6/6/2020</a:t>
+              <a:t>7/25/2020</a:t>
             </a:fld>
             <a:endParaRPr lang="en-US"/>
           </a:p>
@@ -983,7 +984,7 @@
           <a:p>
             <a:fld id="{F75DBC4B-2C55-40A7-A38B-8D2654D87339}" type="datetimeFigureOut">
               <a:rPr lang="en-US" smtClean="0"/>
-              <a:t>6/6/2020</a:t>
+              <a:t>7/25/2020</a:t>
             </a:fld>
             <a:endParaRPr lang="en-US"/>
           </a:p>
@@ -1191,7 +1192,7 @@
           <a:p>
             <a:fld id="{F75DBC4B-2C55-40A7-A38B-8D2654D87339}" type="datetimeFigureOut">
               <a:rPr lang="en-US" smtClean="0"/>
-              <a:t>6/6/2020</a:t>
+              <a:t>7/25/2020</a:t>
             </a:fld>
             <a:endParaRPr lang="en-US"/>
           </a:p>
@@ -1389,7 +1390,7 @@
           <a:p>
             <a:fld id="{F75DBC4B-2C55-40A7-A38B-8D2654D87339}" type="datetimeFigureOut">
               <a:rPr lang="en-US" smtClean="0"/>
-              <a:t>6/6/2020</a:t>
+              <a:t>7/25/2020</a:t>
             </a:fld>
             <a:endParaRPr lang="en-US"/>
           </a:p>
@@ -1664,7 +1665,7 @@
           <a:p>
             <a:fld id="{F75DBC4B-2C55-40A7-A38B-8D2654D87339}" type="datetimeFigureOut">
               <a:rPr lang="en-US" smtClean="0"/>
-              <a:t>6/6/2020</a:t>
+              <a:t>7/25/2020</a:t>
             </a:fld>
             <a:endParaRPr lang="en-US"/>
           </a:p>
@@ -1929,7 +1930,7 @@
           <a:p>
             <a:fld id="{F75DBC4B-2C55-40A7-A38B-8D2654D87339}" type="datetimeFigureOut">
               <a:rPr lang="en-US" smtClean="0"/>
-              <a:t>6/6/2020</a:t>
+              <a:t>7/25/2020</a:t>
             </a:fld>
             <a:endParaRPr lang="en-US"/>
           </a:p>
@@ -2341,7 +2342,7 @@
           <a:p>
             <a:fld id="{F75DBC4B-2C55-40A7-A38B-8D2654D87339}" type="datetimeFigureOut">
               <a:rPr lang="en-US" smtClean="0"/>
-              <a:t>6/6/2020</a:t>
+              <a:t>7/25/2020</a:t>
             </a:fld>
             <a:endParaRPr lang="en-US"/>
           </a:p>
@@ -2482,7 +2483,7 @@
           <a:p>
             <a:fld id="{F75DBC4B-2C55-40A7-A38B-8D2654D87339}" type="datetimeFigureOut">
               <a:rPr lang="en-US" smtClean="0"/>
-              <a:t>6/6/2020</a:t>
+              <a:t>7/25/2020</a:t>
             </a:fld>
             <a:endParaRPr lang="en-US"/>
           </a:p>
@@ -2595,7 +2596,7 @@
           <a:p>
             <a:fld id="{F75DBC4B-2C55-40A7-A38B-8D2654D87339}" type="datetimeFigureOut">
               <a:rPr lang="en-US" smtClean="0"/>
-              <a:t>6/6/2020</a:t>
+              <a:t>7/25/2020</a:t>
             </a:fld>
             <a:endParaRPr lang="en-US"/>
           </a:p>
@@ -2906,7 +2907,7 @@
           <a:p>
             <a:fld id="{F75DBC4B-2C55-40A7-A38B-8D2654D87339}" type="datetimeFigureOut">
               <a:rPr lang="en-US" smtClean="0"/>
-              <a:t>6/6/2020</a:t>
+              <a:t>7/25/2020</a:t>
             </a:fld>
             <a:endParaRPr lang="en-US"/>
           </a:p>
@@ -3194,7 +3195,7 @@
           <a:p>
             <a:fld id="{F75DBC4B-2C55-40A7-A38B-8D2654D87339}" type="datetimeFigureOut">
               <a:rPr lang="en-US" smtClean="0"/>
-              <a:t>6/6/2020</a:t>
+              <a:t>7/25/2020</a:t>
             </a:fld>
             <a:endParaRPr lang="en-US"/>
           </a:p>
@@ -3435,7 +3436,7 @@
           <a:p>
             <a:fld id="{F75DBC4B-2C55-40A7-A38B-8D2654D87339}" type="datetimeFigureOut">
               <a:rPr lang="en-US" smtClean="0"/>
-              <a:t>6/6/2020</a:t>
+              <a:t>7/25/2020</a:t>
             </a:fld>
             <a:endParaRPr lang="en-US"/>
           </a:p>
@@ -6011,6 +6012,251 @@
     <p:extLst>
       <p:ext uri="{BB962C8B-B14F-4D97-AF65-F5344CB8AC3E}">
         <p14:creationId xmlns:p14="http://schemas.microsoft.com/office/powerpoint/2010/main" val="3494284679"/>
+      </p:ext>
+    </p:extLst>
+  </p:cSld>
+  <p:clrMapOvr>
+    <a:masterClrMapping/>
+  </p:clrMapOvr>
+</p:sld>
+</file>
+
+<file path=ppt/slides/slide8.xml><?xml version="1.0" encoding="utf-8"?>
+<p:sld xmlns:a="http://schemas.openxmlformats.org/drawingml/2006/main" xmlns:r="http://schemas.openxmlformats.org/officeDocument/2006/relationships" xmlns:p="http://schemas.openxmlformats.org/presentationml/2006/main">
+  <p:cSld>
+    <p:spTree>
+      <p:nvGrpSpPr>
+        <p:cNvPr id="1" name=""/>
+        <p:cNvGrpSpPr/>
+        <p:nvPr/>
+      </p:nvGrpSpPr>
+      <p:grpSpPr>
+        <a:xfrm>
+          <a:off x="0" y="0"/>
+          <a:ext cx="0" cy="0"/>
+          <a:chOff x="0" y="0"/>
+          <a:chExt cx="0" cy="0"/>
+        </a:xfrm>
+      </p:grpSpPr>
+      <p:pic>
+        <p:nvPicPr>
+          <p:cNvPr id="3" name="Picture 2" descr="A close up of a logo&#10;&#10;Description automatically generated">
+            <a:extLst>
+              <a:ext uri="{FF2B5EF4-FFF2-40B4-BE49-F238E27FC236}">
+                <a16:creationId xmlns:a16="http://schemas.microsoft.com/office/drawing/2014/main" id="{89DE8772-340B-49EF-8F0D-FA0D9BF91073}"/>
+              </a:ext>
+            </a:extLst>
+          </p:cNvPr>
+          <p:cNvPicPr>
+            <a:picLocks noChangeAspect="1"/>
+          </p:cNvPicPr>
+          <p:nvPr/>
+        </p:nvPicPr>
+        <p:blipFill rotWithShape="1">
+          <a:blip r:embed="rId2">
+            <a:extLst>
+              <a:ext uri="{28A0092B-C50C-407E-A947-70E740481C1C}">
+                <a14:useLocalDpi xmlns:a14="http://schemas.microsoft.com/office/drawing/2010/main" val="0"/>
+              </a:ext>
+            </a:extLst>
+          </a:blip>
+          <a:srcRect l="26800" t="13605" r="8650" b="41995"/>
+          <a:stretch/>
+        </p:blipFill>
+        <p:spPr>
+          <a:xfrm>
+            <a:off x="0" y="0"/>
+            <a:ext cx="12192000" cy="6857999"/>
+          </a:xfrm>
+          <a:prstGeom prst="rect">
+            <a:avLst/>
+          </a:prstGeom>
+        </p:spPr>
+      </p:pic>
+      <p:sp>
+        <p:nvSpPr>
+          <p:cNvPr id="2" name="Rectangle 1">
+            <a:extLst>
+              <a:ext uri="{FF2B5EF4-FFF2-40B4-BE49-F238E27FC236}">
+                <a16:creationId xmlns:a16="http://schemas.microsoft.com/office/drawing/2014/main" id="{B44291EF-8871-408D-9A60-A947A95D2B28}"/>
+              </a:ext>
+            </a:extLst>
+          </p:cNvPr>
+          <p:cNvSpPr/>
+          <p:nvPr/>
+        </p:nvSpPr>
+        <p:spPr>
+          <a:xfrm>
+            <a:off x="4878517" y="2559665"/>
+            <a:ext cx="2665284" cy="1046440"/>
+          </a:xfrm>
+          <a:prstGeom prst="rect">
+            <a:avLst/>
+          </a:prstGeom>
+        </p:spPr>
+        <p:txBody>
+          <a:bodyPr wrap="square">
+            <a:spAutoFit/>
+          </a:bodyPr>
+          <a:lstStyle/>
+          <a:p>
+            <a:r>
+              <a:rPr lang="en-US" sz="6200" dirty="0">
+                <a:effectLst>
+                  <a:glow>
+                    <a:schemeClr val="accent6">
+                      <a:lumMod val="60000"/>
+                      <a:lumOff val="40000"/>
+                      <a:alpha val="40000"/>
+                    </a:schemeClr>
+                  </a:glow>
+                </a:effectLst>
+                <a:latin typeface="Garamond" panose="02020404030301010803" pitchFamily="18" charset="0"/>
+              </a:rPr>
+              <a:t>Play As:</a:t>
+            </a:r>
+          </a:p>
+        </p:txBody>
+      </p:sp>
+      <p:sp>
+        <p:nvSpPr>
+          <p:cNvPr id="4" name="Rectangle 3">
+            <a:extLst>
+              <a:ext uri="{FF2B5EF4-FFF2-40B4-BE49-F238E27FC236}">
+                <a16:creationId xmlns:a16="http://schemas.microsoft.com/office/drawing/2014/main" id="{D3340671-F410-47C9-9DD8-F5C18655D8DC}"/>
+              </a:ext>
+            </a:extLst>
+          </p:cNvPr>
+          <p:cNvSpPr/>
+          <p:nvPr/>
+        </p:nvSpPr>
+        <p:spPr>
+          <a:xfrm>
+            <a:off x="5536601" y="3438524"/>
+            <a:ext cx="1217483" cy="646331"/>
+          </a:xfrm>
+          <a:prstGeom prst="rect">
+            <a:avLst/>
+          </a:prstGeom>
+        </p:spPr>
+        <p:txBody>
+          <a:bodyPr wrap="square">
+            <a:spAutoFit/>
+          </a:bodyPr>
+          <a:lstStyle/>
+          <a:p>
+            <a:r>
+              <a:rPr lang="en-US" sz="3600" dirty="0">
+                <a:effectLst>
+                  <a:glow>
+                    <a:schemeClr val="accent6">
+                      <a:lumMod val="60000"/>
+                      <a:lumOff val="40000"/>
+                      <a:alpha val="40000"/>
+                    </a:schemeClr>
+                  </a:glow>
+                </a:effectLst>
+                <a:latin typeface="Garamond" panose="02020404030301010803" pitchFamily="18" charset="0"/>
+              </a:rPr>
+              <a:t>white</a:t>
+            </a:r>
+          </a:p>
+        </p:txBody>
+      </p:sp>
+      <p:sp>
+        <p:nvSpPr>
+          <p:cNvPr id="5" name="Rectangle 4">
+            <a:extLst>
+              <a:ext uri="{FF2B5EF4-FFF2-40B4-BE49-F238E27FC236}">
+                <a16:creationId xmlns:a16="http://schemas.microsoft.com/office/drawing/2014/main" id="{17F1A822-2486-4006-9994-A8A2D4BB43B1}"/>
+              </a:ext>
+            </a:extLst>
+          </p:cNvPr>
+          <p:cNvSpPr/>
+          <p:nvPr/>
+        </p:nvSpPr>
+        <p:spPr>
+          <a:xfrm>
+            <a:off x="5536601" y="3924299"/>
+            <a:ext cx="1217483" cy="646331"/>
+          </a:xfrm>
+          <a:prstGeom prst="rect">
+            <a:avLst/>
+          </a:prstGeom>
+        </p:spPr>
+        <p:txBody>
+          <a:bodyPr wrap="square">
+            <a:spAutoFit/>
+          </a:bodyPr>
+          <a:lstStyle/>
+          <a:p>
+            <a:r>
+              <a:rPr lang="en-US" sz="3600" dirty="0">
+                <a:effectLst>
+                  <a:glow>
+                    <a:schemeClr val="accent6">
+                      <a:lumMod val="60000"/>
+                      <a:lumOff val="40000"/>
+                      <a:alpha val="40000"/>
+                    </a:schemeClr>
+                  </a:glow>
+                </a:effectLst>
+                <a:latin typeface="Garamond" panose="02020404030301010803" pitchFamily="18" charset="0"/>
+              </a:rPr>
+              <a:t>black</a:t>
+            </a:r>
+          </a:p>
+        </p:txBody>
+      </p:sp>
+      <p:sp>
+        <p:nvSpPr>
+          <p:cNvPr id="6" name="Rectangle 5">
+            <a:extLst>
+              <a:ext uri="{FF2B5EF4-FFF2-40B4-BE49-F238E27FC236}">
+                <a16:creationId xmlns:a16="http://schemas.microsoft.com/office/drawing/2014/main" id="{799BCAC8-7B8D-4295-937B-B0A79CD959A1}"/>
+              </a:ext>
+            </a:extLst>
+          </p:cNvPr>
+          <p:cNvSpPr/>
+          <p:nvPr/>
+        </p:nvSpPr>
+        <p:spPr>
+          <a:xfrm>
+            <a:off x="5536601" y="4484964"/>
+            <a:ext cx="1217483" cy="646331"/>
+          </a:xfrm>
+          <a:prstGeom prst="rect">
+            <a:avLst/>
+          </a:prstGeom>
+        </p:spPr>
+        <p:txBody>
+          <a:bodyPr wrap="square">
+            <a:spAutoFit/>
+          </a:bodyPr>
+          <a:lstStyle/>
+          <a:p>
+            <a:r>
+              <a:rPr lang="en-US" sz="3600" dirty="0">
+                <a:effectLst>
+                  <a:glow>
+                    <a:schemeClr val="accent6">
+                      <a:lumMod val="60000"/>
+                      <a:lumOff val="40000"/>
+                      <a:alpha val="40000"/>
+                    </a:schemeClr>
+                  </a:glow>
+                </a:effectLst>
+                <a:latin typeface="Garamond" panose="02020404030301010803" pitchFamily="18" charset="0"/>
+              </a:rPr>
+              <a:t>test</a:t>
+            </a:r>
+          </a:p>
+        </p:txBody>
+      </p:sp>
+    </p:spTree>
+    <p:extLst>
+      <p:ext uri="{BB962C8B-B14F-4D97-AF65-F5344CB8AC3E}">
+        <p14:creationId xmlns:p14="http://schemas.microsoft.com/office/powerpoint/2010/main" val="2511156982"/>
       </p:ext>
     </p:extLst>
   </p:cSld>

</xml_diff>

<commit_message>
Nav bars fully implemented.
</commit_message>
<xml_diff>
--- a/react_frontend/public/Images/Draft Images/page ideas.pptx
+++ b/react_frontend/public/Images/Draft Images/page ideas.pptx
@@ -204,7 +204,7 @@
           <a:p>
             <a:fld id="{C9B821EE-64D9-4FB8-A02C-362FA67433CA}" type="datetimeFigureOut">
               <a:rPr lang="en-US" smtClean="0"/>
-              <a:t>7/25/2020</a:t>
+              <a:t>7/31/2020</a:t>
             </a:fld>
             <a:endParaRPr lang="en-US"/>
           </a:p>
@@ -786,7 +786,7 @@
           <a:p>
             <a:fld id="{F75DBC4B-2C55-40A7-A38B-8D2654D87339}" type="datetimeFigureOut">
               <a:rPr lang="en-US" smtClean="0"/>
-              <a:t>7/25/2020</a:t>
+              <a:t>7/31/2020</a:t>
             </a:fld>
             <a:endParaRPr lang="en-US"/>
           </a:p>
@@ -984,7 +984,7 @@
           <a:p>
             <a:fld id="{F75DBC4B-2C55-40A7-A38B-8D2654D87339}" type="datetimeFigureOut">
               <a:rPr lang="en-US" smtClean="0"/>
-              <a:t>7/25/2020</a:t>
+              <a:t>7/31/2020</a:t>
             </a:fld>
             <a:endParaRPr lang="en-US"/>
           </a:p>
@@ -1192,7 +1192,7 @@
           <a:p>
             <a:fld id="{F75DBC4B-2C55-40A7-A38B-8D2654D87339}" type="datetimeFigureOut">
               <a:rPr lang="en-US" smtClean="0"/>
-              <a:t>7/25/2020</a:t>
+              <a:t>7/31/2020</a:t>
             </a:fld>
             <a:endParaRPr lang="en-US"/>
           </a:p>
@@ -1390,7 +1390,7 @@
           <a:p>
             <a:fld id="{F75DBC4B-2C55-40A7-A38B-8D2654D87339}" type="datetimeFigureOut">
               <a:rPr lang="en-US" smtClean="0"/>
-              <a:t>7/25/2020</a:t>
+              <a:t>7/31/2020</a:t>
             </a:fld>
             <a:endParaRPr lang="en-US"/>
           </a:p>
@@ -1665,7 +1665,7 @@
           <a:p>
             <a:fld id="{F75DBC4B-2C55-40A7-A38B-8D2654D87339}" type="datetimeFigureOut">
               <a:rPr lang="en-US" smtClean="0"/>
-              <a:t>7/25/2020</a:t>
+              <a:t>7/31/2020</a:t>
             </a:fld>
             <a:endParaRPr lang="en-US"/>
           </a:p>
@@ -1930,7 +1930,7 @@
           <a:p>
             <a:fld id="{F75DBC4B-2C55-40A7-A38B-8D2654D87339}" type="datetimeFigureOut">
               <a:rPr lang="en-US" smtClean="0"/>
-              <a:t>7/25/2020</a:t>
+              <a:t>7/31/2020</a:t>
             </a:fld>
             <a:endParaRPr lang="en-US"/>
           </a:p>
@@ -2342,7 +2342,7 @@
           <a:p>
             <a:fld id="{F75DBC4B-2C55-40A7-A38B-8D2654D87339}" type="datetimeFigureOut">
               <a:rPr lang="en-US" smtClean="0"/>
-              <a:t>7/25/2020</a:t>
+              <a:t>7/31/2020</a:t>
             </a:fld>
             <a:endParaRPr lang="en-US"/>
           </a:p>
@@ -2483,7 +2483,7 @@
           <a:p>
             <a:fld id="{F75DBC4B-2C55-40A7-A38B-8D2654D87339}" type="datetimeFigureOut">
               <a:rPr lang="en-US" smtClean="0"/>
-              <a:t>7/25/2020</a:t>
+              <a:t>7/31/2020</a:t>
             </a:fld>
             <a:endParaRPr lang="en-US"/>
           </a:p>
@@ -2596,7 +2596,7 @@
           <a:p>
             <a:fld id="{F75DBC4B-2C55-40A7-A38B-8D2654D87339}" type="datetimeFigureOut">
               <a:rPr lang="en-US" smtClean="0"/>
-              <a:t>7/25/2020</a:t>
+              <a:t>7/31/2020</a:t>
             </a:fld>
             <a:endParaRPr lang="en-US"/>
           </a:p>
@@ -2907,7 +2907,7 @@
           <a:p>
             <a:fld id="{F75DBC4B-2C55-40A7-A38B-8D2654D87339}" type="datetimeFigureOut">
               <a:rPr lang="en-US" smtClean="0"/>
-              <a:t>7/25/2020</a:t>
+              <a:t>7/31/2020</a:t>
             </a:fld>
             <a:endParaRPr lang="en-US"/>
           </a:p>
@@ -3195,7 +3195,7 @@
           <a:p>
             <a:fld id="{F75DBC4B-2C55-40A7-A38B-8D2654D87339}" type="datetimeFigureOut">
               <a:rPr lang="en-US" smtClean="0"/>
-              <a:t>7/25/2020</a:t>
+              <a:t>7/31/2020</a:t>
             </a:fld>
             <a:endParaRPr lang="en-US"/>
           </a:p>
@@ -3436,7 +3436,7 @@
           <a:p>
             <a:fld id="{F75DBC4B-2C55-40A7-A38B-8D2654D87339}" type="datetimeFigureOut">
               <a:rPr lang="en-US" smtClean="0"/>
-              <a:t>7/25/2020</a:t>
+              <a:t>7/31/2020</a:t>
             </a:fld>
             <a:endParaRPr lang="en-US"/>
           </a:p>
@@ -5851,7 +5851,7 @@
         </p:nvSpPr>
         <p:spPr>
           <a:xfrm>
-            <a:off x="5675552" y="3936603"/>
+            <a:off x="5332652" y="3284266"/>
             <a:ext cx="1154544" cy="289466"/>
           </a:xfrm>
           <a:prstGeom prst="rect">

</xml_diff>

<commit_message>
All Nav bars styled and working correctly
</commit_message>
<xml_diff>
--- a/react_frontend/public/Images/Draft Images/page ideas.pptx
+++ b/react_frontend/public/Images/Draft Images/page ideas.pptx
@@ -5,17 +5,18 @@
     <p:sldMasterId id="2147483770" r:id="rId1"/>
   </p:sldMasterIdLst>
   <p:notesMasterIdLst>
-    <p:notesMasterId r:id="rId10"/>
+    <p:notesMasterId r:id="rId11"/>
   </p:notesMasterIdLst>
   <p:sldIdLst>
     <p:sldId id="265" r:id="rId2"/>
     <p:sldId id="259" r:id="rId3"/>
-    <p:sldId id="262" r:id="rId4"/>
-    <p:sldId id="264" r:id="rId5"/>
-    <p:sldId id="266" r:id="rId6"/>
-    <p:sldId id="267" r:id="rId7"/>
-    <p:sldId id="268" r:id="rId8"/>
-    <p:sldId id="269" r:id="rId9"/>
+    <p:sldId id="270" r:id="rId4"/>
+    <p:sldId id="262" r:id="rId5"/>
+    <p:sldId id="264" r:id="rId6"/>
+    <p:sldId id="266" r:id="rId7"/>
+    <p:sldId id="267" r:id="rId8"/>
+    <p:sldId id="268" r:id="rId9"/>
+    <p:sldId id="269" r:id="rId10"/>
   </p:sldIdLst>
   <p:sldSz cx="12192000" cy="6858000"/>
   <p:notesSz cx="6858000" cy="9144000"/>
@@ -536,7 +537,7 @@
           <a:p>
             <a:fld id="{10128F20-7B00-4F60-B858-C1A8181706A6}" type="slidenum">
               <a:rPr lang="en-US" smtClean="0"/>
-              <a:t>3</a:t>
+              <a:t>4</a:t>
             </a:fld>
             <a:endParaRPr lang="en-US"/>
           </a:p>
@@ -620,7 +621,7 @@
           <a:p>
             <a:fld id="{10128F20-7B00-4F60-B858-C1A8181706A6}" type="slidenum">
               <a:rPr lang="en-US" smtClean="0"/>
-              <a:t>4</a:t>
+              <a:t>5</a:t>
             </a:fld>
             <a:endParaRPr lang="en-US"/>
           </a:p>
@@ -4794,6 +4795,73 @@
           <a:chExt cx="0" cy="0"/>
         </a:xfrm>
       </p:grpSpPr>
+      <p:pic>
+        <p:nvPicPr>
+          <p:cNvPr id="3" name="Picture 2" descr="A close up of a logo&#10;&#10;Description automatically generated">
+            <a:extLst>
+              <a:ext uri="{FF2B5EF4-FFF2-40B4-BE49-F238E27FC236}">
+                <a16:creationId xmlns:a16="http://schemas.microsoft.com/office/drawing/2014/main" id="{CCBB36FF-78CA-4315-B9C5-E7881E743BEA}"/>
+              </a:ext>
+            </a:extLst>
+          </p:cNvPr>
+          <p:cNvPicPr>
+            <a:picLocks noChangeAspect="1"/>
+          </p:cNvPicPr>
+          <p:nvPr/>
+        </p:nvPicPr>
+        <p:blipFill>
+          <a:blip r:embed="rId2">
+            <a:alphaModFix/>
+            <a:extLst>
+              <a:ext uri="{28A0092B-C50C-407E-A947-70E740481C1C}">
+                <a14:useLocalDpi xmlns:a14="http://schemas.microsoft.com/office/drawing/2010/main" val="0"/>
+              </a:ext>
+            </a:extLst>
+          </a:blip>
+          <a:stretch>
+            <a:fillRect/>
+          </a:stretch>
+        </p:blipFill>
+        <p:spPr>
+          <a:xfrm>
+            <a:off x="2449760" y="1"/>
+            <a:ext cx="6858000" cy="6858000"/>
+          </a:xfrm>
+          <a:prstGeom prst="rect">
+            <a:avLst/>
+          </a:prstGeom>
+        </p:spPr>
+      </p:pic>
+    </p:spTree>
+    <p:extLst>
+      <p:ext uri="{BB962C8B-B14F-4D97-AF65-F5344CB8AC3E}">
+        <p14:creationId xmlns:p14="http://schemas.microsoft.com/office/powerpoint/2010/main" val="2429195781"/>
+      </p:ext>
+    </p:extLst>
+  </p:cSld>
+  <p:clrMapOvr>
+    <a:masterClrMapping/>
+  </p:clrMapOvr>
+</p:sld>
+</file>
+
+<file path=ppt/slides/slide4.xml><?xml version="1.0" encoding="utf-8"?>
+<p:sld xmlns:a="http://schemas.openxmlformats.org/drawingml/2006/main" xmlns:r="http://schemas.openxmlformats.org/officeDocument/2006/relationships" xmlns:p="http://schemas.openxmlformats.org/presentationml/2006/main">
+  <p:cSld>
+    <p:spTree>
+      <p:nvGrpSpPr>
+        <p:cNvPr id="1" name=""/>
+        <p:cNvGrpSpPr/>
+        <p:nvPr/>
+      </p:nvGrpSpPr>
+      <p:grpSpPr>
+        <a:xfrm>
+          <a:off x="0" y="0"/>
+          <a:ext cx="0" cy="0"/>
+          <a:chOff x="0" y="0"/>
+          <a:chExt cx="0" cy="0"/>
+        </a:xfrm>
+      </p:grpSpPr>
       <p:sp>
         <p:nvSpPr>
           <p:cNvPr id="8" name="Rectangle 7">
@@ -5407,7 +5475,7 @@
 </p:sld>
 </file>
 
-<file path=ppt/slides/slide4.xml><?xml version="1.0" encoding="utf-8"?>
+<file path=ppt/slides/slide5.xml><?xml version="1.0" encoding="utf-8"?>
 <p:sld xmlns:a="http://schemas.openxmlformats.org/drawingml/2006/main" xmlns:r="http://schemas.openxmlformats.org/officeDocument/2006/relationships" xmlns:p="http://schemas.openxmlformats.org/presentationml/2006/main">
   <p:cSld>
     <p:spTree>
@@ -5630,7 +5698,7 @@
 </p:sld>
 </file>
 
-<file path=ppt/slides/slide5.xml><?xml version="1.0" encoding="utf-8"?>
+<file path=ppt/slides/slide6.xml><?xml version="1.0" encoding="utf-8"?>
 <p:sld xmlns:a="http://schemas.openxmlformats.org/drawingml/2006/main" xmlns:r="http://schemas.openxmlformats.org/officeDocument/2006/relationships" xmlns:p="http://schemas.openxmlformats.org/presentationml/2006/main">
   <p:cSld>
     <p:spTree>
@@ -5740,7 +5808,7 @@
 </p:sld>
 </file>
 
-<file path=ppt/slides/slide6.xml><?xml version="1.0" encoding="utf-8"?>
+<file path=ppt/slides/slide7.xml><?xml version="1.0" encoding="utf-8"?>
 <p:sld xmlns:a="http://schemas.openxmlformats.org/drawingml/2006/main" xmlns:r="http://schemas.openxmlformats.org/officeDocument/2006/relationships" xmlns:p="http://schemas.openxmlformats.org/presentationml/2006/main">
   <p:cSld>
     <p:spTree>
@@ -5911,7 +5979,7 @@
 </p:sld>
 </file>
 
-<file path=ppt/slides/slide7.xml><?xml version="1.0" encoding="utf-8"?>
+<file path=ppt/slides/slide8.xml><?xml version="1.0" encoding="utf-8"?>
 <p:sld xmlns:a="http://schemas.openxmlformats.org/drawingml/2006/main" xmlns:r="http://schemas.openxmlformats.org/officeDocument/2006/relationships" xmlns:p="http://schemas.openxmlformats.org/presentationml/2006/main">
   <p:cSld>
     <p:spTree>
@@ -6021,7 +6089,7 @@
 </p:sld>
 </file>
 
-<file path=ppt/slides/slide8.xml><?xml version="1.0" encoding="utf-8"?>
+<file path=ppt/slides/slide9.xml><?xml version="1.0" encoding="utf-8"?>
 <p:sld xmlns:a="http://schemas.openxmlformats.org/drawingml/2006/main" xmlns:r="http://schemas.openxmlformats.org/officeDocument/2006/relationships" xmlns:p="http://schemas.openxmlformats.org/presentationml/2006/main">
   <p:cSld>
     <p:spTree>

</xml_diff>